<commit_message>
Login-Logout only read tested. Debug added
</commit_message>
<xml_diff>
--- a/Description/WebLoginLogout.pptx
+++ b/Description/WebLoginLogout.pptx
@@ -261,7 +261,7 @@
           <a:p>
             <a:fld id="{DDCE6D58-9B57-4731-A47B-3CD41B48F0A9}" type="datetimeFigureOut">
               <a:rPr lang="de-CH" smtClean="0"/>
-              <a:t>12.05.2023</a:t>
+              <a:t>13.05.2023</a:t>
             </a:fld>
             <a:endParaRPr lang="de-CH"/>
           </a:p>
@@ -431,7 +431,7 @@
           <a:p>
             <a:fld id="{DDCE6D58-9B57-4731-A47B-3CD41B48F0A9}" type="datetimeFigureOut">
               <a:rPr lang="de-CH" smtClean="0"/>
-              <a:t>12.05.2023</a:t>
+              <a:t>13.05.2023</a:t>
             </a:fld>
             <a:endParaRPr lang="de-CH"/>
           </a:p>
@@ -611,7 +611,7 @@
           <a:p>
             <a:fld id="{DDCE6D58-9B57-4731-A47B-3CD41B48F0A9}" type="datetimeFigureOut">
               <a:rPr lang="de-CH" smtClean="0"/>
-              <a:t>12.05.2023</a:t>
+              <a:t>13.05.2023</a:t>
             </a:fld>
             <a:endParaRPr lang="de-CH"/>
           </a:p>
@@ -781,7 +781,7 @@
           <a:p>
             <a:fld id="{DDCE6D58-9B57-4731-A47B-3CD41B48F0A9}" type="datetimeFigureOut">
               <a:rPr lang="de-CH" smtClean="0"/>
-              <a:t>12.05.2023</a:t>
+              <a:t>13.05.2023</a:t>
             </a:fld>
             <a:endParaRPr lang="de-CH"/>
           </a:p>
@@ -1027,7 +1027,7 @@
           <a:p>
             <a:fld id="{DDCE6D58-9B57-4731-A47B-3CD41B48F0A9}" type="datetimeFigureOut">
               <a:rPr lang="de-CH" smtClean="0"/>
-              <a:t>12.05.2023</a:t>
+              <a:t>13.05.2023</a:t>
             </a:fld>
             <a:endParaRPr lang="de-CH"/>
           </a:p>
@@ -1259,7 +1259,7 @@
           <a:p>
             <a:fld id="{DDCE6D58-9B57-4731-A47B-3CD41B48F0A9}" type="datetimeFigureOut">
               <a:rPr lang="de-CH" smtClean="0"/>
-              <a:t>12.05.2023</a:t>
+              <a:t>13.05.2023</a:t>
             </a:fld>
             <a:endParaRPr lang="de-CH"/>
           </a:p>
@@ -1626,7 +1626,7 @@
           <a:p>
             <a:fld id="{DDCE6D58-9B57-4731-A47B-3CD41B48F0A9}" type="datetimeFigureOut">
               <a:rPr lang="de-CH" smtClean="0"/>
-              <a:t>12.05.2023</a:t>
+              <a:t>13.05.2023</a:t>
             </a:fld>
             <a:endParaRPr lang="de-CH"/>
           </a:p>
@@ -1744,7 +1744,7 @@
           <a:p>
             <a:fld id="{DDCE6D58-9B57-4731-A47B-3CD41B48F0A9}" type="datetimeFigureOut">
               <a:rPr lang="de-CH" smtClean="0"/>
-              <a:t>12.05.2023</a:t>
+              <a:t>13.05.2023</a:t>
             </a:fld>
             <a:endParaRPr lang="de-CH"/>
           </a:p>
@@ -1839,7 +1839,7 @@
           <a:p>
             <a:fld id="{DDCE6D58-9B57-4731-A47B-3CD41B48F0A9}" type="datetimeFigureOut">
               <a:rPr lang="de-CH" smtClean="0"/>
-              <a:t>12.05.2023</a:t>
+              <a:t>13.05.2023</a:t>
             </a:fld>
             <a:endParaRPr lang="de-CH"/>
           </a:p>
@@ -2116,7 +2116,7 @@
           <a:p>
             <a:fld id="{DDCE6D58-9B57-4731-A47B-3CD41B48F0A9}" type="datetimeFigureOut">
               <a:rPr lang="de-CH" smtClean="0"/>
-              <a:t>12.05.2023</a:t>
+              <a:t>13.05.2023</a:t>
             </a:fld>
             <a:endParaRPr lang="de-CH"/>
           </a:p>
@@ -2369,7 +2369,7 @@
           <a:p>
             <a:fld id="{DDCE6D58-9B57-4731-A47B-3CD41B48F0A9}" type="datetimeFigureOut">
               <a:rPr lang="de-CH" smtClean="0"/>
-              <a:t>12.05.2023</a:t>
+              <a:t>13.05.2023</a:t>
             </a:fld>
             <a:endParaRPr lang="de-CH"/>
           </a:p>
@@ -2582,7 +2582,7 @@
           <a:p>
             <a:fld id="{DDCE6D58-9B57-4731-A47B-3CD41B48F0A9}" type="datetimeFigureOut">
               <a:rPr lang="de-CH" smtClean="0"/>
-              <a:t>12.05.2023</a:t>
+              <a:t>13.05.2023</a:t>
             </a:fld>
             <a:endParaRPr lang="de-CH"/>
           </a:p>
@@ -7849,7 +7849,27 @@
                 <a:latin typeface="Arial" panose="020B0604020202020204" pitchFamily="34" charset="0"/>
                 <a:cs typeface="Arial" panose="020B0604020202020204" pitchFamily="34" charset="0"/>
               </a:rPr>
-              <a:t>Strings, captions and styles</a:t>
+              <a:t>Strings, captions, </a:t>
+            </a:r>
+            <a:r>
+              <a:rPr lang="en-US" sz="1000" b="1">
+                <a:solidFill>
+                  <a:schemeClr val="tx1"/>
+                </a:solidFill>
+                <a:latin typeface="Arial" panose="020B0604020202020204" pitchFamily="34" charset="0"/>
+                <a:cs typeface="Arial" panose="020B0604020202020204" pitchFamily="34" charset="0"/>
+              </a:rPr>
+              <a:t>file names </a:t>
+            </a:r>
+            <a:r>
+              <a:rPr lang="en-US" sz="1000" b="1" dirty="0">
+                <a:solidFill>
+                  <a:schemeClr val="tx1"/>
+                </a:solidFill>
+                <a:latin typeface="Arial" panose="020B0604020202020204" pitchFamily="34" charset="0"/>
+                <a:cs typeface="Arial" panose="020B0604020202020204" pitchFamily="34" charset="0"/>
+              </a:rPr>
+              <a:t>and styles</a:t>
             </a:r>
             <a:r>
               <a:rPr lang="de-CH" sz="1000" b="1" dirty="0">
@@ -10282,6 +10302,224 @@
           </a:p>
           <a:p>
             <a:endParaRPr lang="de-CH" sz="800" b="1" dirty="0">
+              <a:solidFill>
+                <a:schemeClr val="tx1"/>
+              </a:solidFill>
+              <a:latin typeface="Arial" panose="020B0604020202020204" pitchFamily="34" charset="0"/>
+              <a:cs typeface="Arial" panose="020B0604020202020204" pitchFamily="34" charset="0"/>
+            </a:endParaRPr>
+          </a:p>
+        </p:txBody>
+      </p:sp>
+      <p:sp>
+        <p:nvSpPr>
+          <p:cNvPr id="3" name="Rechteck 2">
+            <a:extLst>
+              <a:ext uri="{FF2B5EF4-FFF2-40B4-BE49-F238E27FC236}">
+                <a16:creationId xmlns:a16="http://schemas.microsoft.com/office/drawing/2014/main" id="{89CCFA72-7DC0-6B4F-D858-6C40F4BFA0F9}"/>
+              </a:ext>
+            </a:extLst>
+          </p:cNvPr>
+          <p:cNvSpPr/>
+          <p:nvPr/>
+        </p:nvSpPr>
+        <p:spPr>
+          <a:xfrm>
+            <a:off x="6262766" y="5093748"/>
+            <a:ext cx="2958668" cy="1183301"/>
+          </a:xfrm>
+          <a:prstGeom prst="rect">
+            <a:avLst/>
+          </a:prstGeom>
+          <a:noFill/>
+          <a:ln>
+            <a:solidFill>
+              <a:schemeClr val="tx1"/>
+            </a:solidFill>
+          </a:ln>
+        </p:spPr>
+        <p:style>
+          <a:lnRef idx="2">
+            <a:schemeClr val="accent1">
+              <a:shade val="50000"/>
+            </a:schemeClr>
+          </a:lnRef>
+          <a:fillRef idx="1">
+            <a:schemeClr val="accent1"/>
+          </a:fillRef>
+          <a:effectRef idx="0">
+            <a:schemeClr val="accent1"/>
+          </a:effectRef>
+          <a:fontRef idx="minor">
+            <a:schemeClr val="lt1"/>
+          </a:fontRef>
+        </p:style>
+        <p:txBody>
+          <a:bodyPr rtlCol="0" anchor="ctr"/>
+          <a:lstStyle/>
+          <a:p>
+            <a:pPr algn="ctr"/>
+            <a:endParaRPr lang="de-CH"/>
+          </a:p>
+        </p:txBody>
+      </p:sp>
+      <p:sp>
+        <p:nvSpPr>
+          <p:cNvPr id="9" name="Textfeld 8">
+            <a:extLst>
+              <a:ext uri="{FF2B5EF4-FFF2-40B4-BE49-F238E27FC236}">
+                <a16:creationId xmlns:a16="http://schemas.microsoft.com/office/drawing/2014/main" id="{1244659E-DA97-D7F7-D796-972764F29315}"/>
+              </a:ext>
+            </a:extLst>
+          </p:cNvPr>
+          <p:cNvSpPr txBox="1"/>
+          <p:nvPr/>
+        </p:nvSpPr>
+        <p:spPr>
+          <a:xfrm>
+            <a:off x="6251767" y="4767946"/>
+            <a:ext cx="2888185" cy="307777"/>
+          </a:xfrm>
+          <a:prstGeom prst="rect">
+            <a:avLst/>
+          </a:prstGeom>
+          <a:noFill/>
+        </p:spPr>
+        <p:txBody>
+          <a:bodyPr wrap="square" rtlCol="0">
+            <a:spAutoFit/>
+          </a:bodyPr>
+          <a:lstStyle/>
+          <a:p>
+            <a:r>
+              <a:rPr lang="de-CH" sz="1400" b="1" dirty="0">
+                <a:latin typeface="Arial" panose="020B0604020202020204" pitchFamily="34" charset="0"/>
+                <a:cs typeface="Arial" panose="020B0604020202020204" pitchFamily="34" charset="0"/>
+              </a:rPr>
+              <a:t>Directory </a:t>
+            </a:r>
+            <a:r>
+              <a:rPr lang="de-CH" sz="1400" b="1" dirty="0" err="1">
+                <a:latin typeface="Arial" panose="020B0604020202020204" pitchFamily="34" charset="0"/>
+                <a:cs typeface="Arial" panose="020B0604020202020204" pitchFamily="34" charset="0"/>
+              </a:rPr>
+              <a:t>www</a:t>
+            </a:r>
+            <a:r>
+              <a:rPr lang="de-CH" sz="1400" b="1" dirty="0">
+                <a:latin typeface="Arial" panose="020B0604020202020204" pitchFamily="34" charset="0"/>
+                <a:cs typeface="Arial" panose="020B0604020202020204" pitchFamily="34" charset="0"/>
+              </a:rPr>
+              <a:t>/Tasks/</a:t>
+            </a:r>
+            <a:r>
+              <a:rPr lang="de-CH" sz="1400" b="1" dirty="0" err="1">
+                <a:latin typeface="Arial" panose="020B0604020202020204" pitchFamily="34" charset="0"/>
+                <a:cs typeface="Arial" panose="020B0604020202020204" pitchFamily="34" charset="0"/>
+              </a:rPr>
+              <a:t>Php</a:t>
+            </a:r>
+            <a:r>
+              <a:rPr lang="de-CH" sz="1400" b="1" dirty="0">
+                <a:latin typeface="Arial" panose="020B0604020202020204" pitchFamily="34" charset="0"/>
+                <a:cs typeface="Arial" panose="020B0604020202020204" pitchFamily="34" charset="0"/>
+              </a:rPr>
+              <a:t>/Data/</a:t>
+            </a:r>
+          </a:p>
+        </p:txBody>
+      </p:sp>
+      <p:sp>
+        <p:nvSpPr>
+          <p:cNvPr id="55" name="Rechteck: eine Ecke abgeschnitten 54">
+            <a:extLst>
+              <a:ext uri="{FF2B5EF4-FFF2-40B4-BE49-F238E27FC236}">
+                <a16:creationId xmlns:a16="http://schemas.microsoft.com/office/drawing/2014/main" id="{88B71A74-B911-45BD-D846-EC501259FB99}"/>
+              </a:ext>
+            </a:extLst>
+          </p:cNvPr>
+          <p:cNvSpPr/>
+          <p:nvPr/>
+        </p:nvSpPr>
+        <p:spPr>
+          <a:xfrm>
+            <a:off x="6959600" y="5244031"/>
+            <a:ext cx="1253067" cy="793292"/>
+          </a:xfrm>
+          <a:prstGeom prst="snip1Rect">
+            <a:avLst/>
+          </a:prstGeom>
+          <a:noFill/>
+          <a:ln>
+            <a:solidFill>
+              <a:schemeClr val="tx1"/>
+            </a:solidFill>
+          </a:ln>
+        </p:spPr>
+        <p:style>
+          <a:lnRef idx="2">
+            <a:schemeClr val="accent1">
+              <a:shade val="50000"/>
+            </a:schemeClr>
+          </a:lnRef>
+          <a:fillRef idx="1">
+            <a:schemeClr val="accent1"/>
+          </a:fillRef>
+          <a:effectRef idx="0">
+            <a:schemeClr val="accent1"/>
+          </a:effectRef>
+          <a:fontRef idx="minor">
+            <a:schemeClr val="lt1"/>
+          </a:fontRef>
+        </p:style>
+        <p:txBody>
+          <a:bodyPr rtlCol="0" anchor="ctr"/>
+          <a:lstStyle/>
+          <a:p>
+            <a:pPr algn="ctr"/>
+            <a:r>
+              <a:rPr lang="de-CH" sz="1000" b="1" dirty="0">
+                <a:solidFill>
+                  <a:schemeClr val="tx1"/>
+                </a:solidFill>
+                <a:latin typeface="Arial" panose="020B0604020202020204" pitchFamily="34" charset="0"/>
+                <a:cs typeface="Arial" panose="020B0604020202020204" pitchFamily="34" charset="0"/>
+              </a:rPr>
+              <a:t>LoginLogout.txt</a:t>
+            </a:r>
+          </a:p>
+          <a:p>
+            <a:pPr algn="ctr"/>
+            <a:endParaRPr lang="de-CH" sz="1000" b="1" dirty="0">
+              <a:solidFill>
+                <a:schemeClr val="tx1"/>
+              </a:solidFill>
+              <a:latin typeface="Arial" panose="020B0604020202020204" pitchFamily="34" charset="0"/>
+              <a:cs typeface="Arial" panose="020B0604020202020204" pitchFamily="34" charset="0"/>
+            </a:endParaRPr>
+          </a:p>
+          <a:p>
+            <a:pPr algn="ctr"/>
+            <a:endParaRPr lang="de-CH" sz="1000" b="1" dirty="0">
+              <a:solidFill>
+                <a:schemeClr val="tx1"/>
+              </a:solidFill>
+              <a:latin typeface="Arial" panose="020B0604020202020204" pitchFamily="34" charset="0"/>
+              <a:cs typeface="Arial" panose="020B0604020202020204" pitchFamily="34" charset="0"/>
+            </a:endParaRPr>
+          </a:p>
+          <a:p>
+            <a:r>
+              <a:rPr lang="de-CH" sz="1000" b="1" dirty="0" err="1">
+                <a:solidFill>
+                  <a:schemeClr val="tx1"/>
+                </a:solidFill>
+                <a:latin typeface="Arial" panose="020B0604020202020204" pitchFamily="34" charset="0"/>
+                <a:cs typeface="Arial" panose="020B0604020202020204" pitchFamily="34" charset="0"/>
+              </a:rPr>
+              <a:t>login_name</a:t>
+            </a:r>
+            <a:endParaRPr lang="de-CH" sz="1000" b="1" dirty="0">
               <a:solidFill>
                 <a:schemeClr val="tx1"/>
               </a:solidFill>

</xml_diff>